<commit_message>
updated information for oral
</commit_message>
<xml_diff>
--- a/heroin_model_formulation/Opioid_Schematic.pptx
+++ b/heroin_model_formulation/Opioid_Schematic.pptx
@@ -104,22 +104,6 @@
       </a:defRPr>
     </a:lvl9pPr>
   </p:defaultTextStyle>
-  <p:extLst>
-    <p:ext uri="{EFAFB233-063F-42B5-8137-9DF3F51BA10A}">
-      <p15:sldGuideLst xmlns:p15="http://schemas.microsoft.com/office/powerpoint/2012/main">
-        <p15:guide id="1" orient="horz" pos="2160">
-          <p15:clr>
-            <a:srgbClr val="A4A3A4"/>
-          </p15:clr>
-        </p15:guide>
-        <p15:guide id="2" pos="2880">
-          <p15:clr>
-            <a:srgbClr val="A4A3A4"/>
-          </p15:clr>
-        </p15:guide>
-      </p15:sldGuideLst>
-    </p:ext>
-  </p:extLst>
 </p:presentation>
 </file>
 
@@ -301,7 +285,7 @@
           <a:lstStyle/>
           <a:p>
             <a:fld id="{5A3E0873-EA00-D142-ACA6-784333225662}" type="datetimeFigureOut">
-              <a:t>1/13/18</a:t>
+              <a:t>1/10/18</a:t>
             </a:fld>
             <a:endParaRPr lang="en-US"/>
           </a:p>
@@ -467,7 +451,7 @@
           <a:lstStyle/>
           <a:p>
             <a:fld id="{5A3E0873-EA00-D142-ACA6-784333225662}" type="datetimeFigureOut">
-              <a:t>1/13/18</a:t>
+              <a:t>1/10/18</a:t>
             </a:fld>
             <a:endParaRPr lang="en-US"/>
           </a:p>
@@ -643,7 +627,7 @@
           <a:lstStyle/>
           <a:p>
             <a:fld id="{5A3E0873-EA00-D142-ACA6-784333225662}" type="datetimeFigureOut">
-              <a:t>1/13/18</a:t>
+              <a:t>1/10/18</a:t>
             </a:fld>
             <a:endParaRPr lang="en-US"/>
           </a:p>
@@ -809,7 +793,7 @@
           <a:lstStyle/>
           <a:p>
             <a:fld id="{5A3E0873-EA00-D142-ACA6-784333225662}" type="datetimeFigureOut">
-              <a:t>1/13/18</a:t>
+              <a:t>1/10/18</a:t>
             </a:fld>
             <a:endParaRPr lang="en-US"/>
           </a:p>
@@ -1052,7 +1036,7 @@
           <a:lstStyle/>
           <a:p>
             <a:fld id="{5A3E0873-EA00-D142-ACA6-784333225662}" type="datetimeFigureOut">
-              <a:t>1/13/18</a:t>
+              <a:t>1/10/18</a:t>
             </a:fld>
             <a:endParaRPr lang="en-US"/>
           </a:p>
@@ -1335,7 +1319,7 @@
           <a:lstStyle/>
           <a:p>
             <a:fld id="{5A3E0873-EA00-D142-ACA6-784333225662}" type="datetimeFigureOut">
-              <a:t>1/13/18</a:t>
+              <a:t>1/10/18</a:t>
             </a:fld>
             <a:endParaRPr lang="en-US"/>
           </a:p>
@@ -1752,7 +1736,7 @@
           <a:lstStyle/>
           <a:p>
             <a:fld id="{5A3E0873-EA00-D142-ACA6-784333225662}" type="datetimeFigureOut">
-              <a:t>1/13/18</a:t>
+              <a:t>1/10/18</a:t>
             </a:fld>
             <a:endParaRPr lang="en-US"/>
           </a:p>
@@ -1867,7 +1851,7 @@
           <a:lstStyle/>
           <a:p>
             <a:fld id="{5A3E0873-EA00-D142-ACA6-784333225662}" type="datetimeFigureOut">
-              <a:t>1/13/18</a:t>
+              <a:t>1/10/18</a:t>
             </a:fld>
             <a:endParaRPr lang="en-US"/>
           </a:p>
@@ -1960,7 +1944,7 @@
           <a:lstStyle/>
           <a:p>
             <a:fld id="{5A3E0873-EA00-D142-ACA6-784333225662}" type="datetimeFigureOut">
-              <a:t>1/13/18</a:t>
+              <a:t>1/10/18</a:t>
             </a:fld>
             <a:endParaRPr lang="en-US"/>
           </a:p>
@@ -2233,7 +2217,7 @@
           <a:lstStyle/>
           <a:p>
             <a:fld id="{5A3E0873-EA00-D142-ACA6-784333225662}" type="datetimeFigureOut">
-              <a:t>1/13/18</a:t>
+              <a:t>1/10/18</a:t>
             </a:fld>
             <a:endParaRPr lang="en-US"/>
           </a:p>
@@ -2483,7 +2467,7 @@
           <a:lstStyle/>
           <a:p>
             <a:fld id="{5A3E0873-EA00-D142-ACA6-784333225662}" type="datetimeFigureOut">
-              <a:t>1/13/18</a:t>
+              <a:t>1/10/18</a:t>
             </a:fld>
             <a:endParaRPr lang="en-US"/>
           </a:p>
@@ -2692,7 +2676,7 @@
           </a:lstStyle>
           <a:p>
             <a:fld id="{5A3E0873-EA00-D142-ACA6-784333225662}" type="datetimeFigureOut">
-              <a:t>1/13/18</a:t>
+              <a:t>1/10/18</a:t>
             </a:fld>
             <a:endParaRPr lang="en-US"/>
           </a:p>
@@ -3074,7 +3058,7 @@
         </p:nvGrpSpPr>
         <p:grpSpPr>
           <a:xfrm>
-            <a:off x="981167" y="2309572"/>
+            <a:off x="1420637" y="2295746"/>
             <a:ext cx="1033190" cy="742569"/>
             <a:chOff x="1861895" y="2292278"/>
             <a:chExt cx="1033190" cy="742569"/>
@@ -3127,11 +3111,7 @@
             <a:lstStyle/>
             <a:p>
               <a:pPr algn="ctr"/>
-              <a:endParaRPr lang="en-US" sz="1400">
-                <a:latin typeface="Times New Roman" charset="0"/>
-                <a:ea typeface="Times New Roman" charset="0"/>
-                <a:cs typeface="Times New Roman" charset="0"/>
-              </a:endParaRPr>
+              <a:endParaRPr lang="en-US"/>
             </a:p>
           </p:txBody>
         </p:sp>
@@ -3143,8 +3123,8 @@
           </p:nvSpPr>
           <p:spPr>
             <a:xfrm>
-              <a:off x="1926800" y="2399183"/>
-              <a:ext cx="850230" cy="523220"/>
+              <a:off x="1947993" y="2346087"/>
+              <a:ext cx="850230" cy="584776"/>
             </a:xfrm>
             <a:prstGeom prst="rect">
               <a:avLst/>
@@ -3159,17 +3139,15 @@
             <a:p>
               <a:pPr algn="ctr"/>
               <a:r>
-                <a:rPr lang="en-US" sz="2800" dirty="0" smtClean="0">
-                  <a:latin typeface="Times New Roman" charset="0"/>
-                  <a:ea typeface="Times New Roman" charset="0"/>
-                  <a:cs typeface="Times New Roman" charset="0"/>
+                <a:rPr lang="en-US" sz="3200" dirty="0" smtClean="0">
+                  <a:latin typeface="Times New Roman"/>
+                  <a:cs typeface="Times New Roman"/>
                 </a:rPr>
                 <a:t>S</a:t>
               </a:r>
-              <a:endParaRPr lang="en-US" sz="2800" dirty="0">
-                <a:latin typeface="Times New Roman" charset="0"/>
-                <a:ea typeface="Times New Roman" charset="0"/>
-                <a:cs typeface="Times New Roman" charset="0"/>
+              <a:endParaRPr lang="en-US" sz="3200" dirty="0">
+                <a:latin typeface="Times New Roman"/>
+                <a:cs typeface="Times New Roman"/>
               </a:endParaRPr>
             </a:p>
           </p:txBody>
@@ -3183,7 +3161,7 @@
         </p:nvGrpSpPr>
         <p:grpSpPr>
           <a:xfrm>
-            <a:off x="5258411" y="2306803"/>
+            <a:off x="5964093" y="2295746"/>
             <a:ext cx="1033190" cy="742569"/>
             <a:chOff x="1861895" y="2292278"/>
             <a:chExt cx="1033190" cy="742569"/>
@@ -3236,11 +3214,7 @@
             <a:lstStyle/>
             <a:p>
               <a:pPr algn="ctr"/>
-              <a:endParaRPr lang="en-US" sz="1400">
-                <a:latin typeface="Times New Roman" charset="0"/>
-                <a:ea typeface="Times New Roman" charset="0"/>
-                <a:cs typeface="Times New Roman" charset="0"/>
-              </a:endParaRPr>
+              <a:endParaRPr lang="en-US"/>
             </a:p>
           </p:txBody>
         </p:sp>
@@ -3252,8 +3226,8 @@
           </p:nvSpPr>
           <p:spPr>
             <a:xfrm>
-              <a:off x="1931712" y="2395704"/>
-              <a:ext cx="871755" cy="523220"/>
+              <a:off x="1946267" y="2346087"/>
+              <a:ext cx="871755" cy="584776"/>
             </a:xfrm>
             <a:prstGeom prst="rect">
               <a:avLst/>
@@ -3268,10 +3242,9 @@
             <a:p>
               <a:pPr algn="ctr"/>
               <a:r>
-                <a:rPr lang="en-US" sz="2800" dirty="0">
-                  <a:latin typeface="Times New Roman" charset="0"/>
-                  <a:ea typeface="Times New Roman" charset="0"/>
-                  <a:cs typeface="Times New Roman" charset="0"/>
+                <a:rPr lang="en-US" sz="3200" dirty="0">
+                  <a:latin typeface="Times New Roman"/>
+                  <a:cs typeface="Times New Roman"/>
                 </a:rPr>
                 <a:t>A</a:t>
               </a:r>
@@ -3287,8 +3260,8 @@
         </p:nvGrpSpPr>
         <p:grpSpPr>
           <a:xfrm>
-            <a:off x="4183853" y="4002556"/>
-            <a:ext cx="1127949" cy="742569"/>
+            <a:off x="3738005" y="3983625"/>
+            <a:ext cx="1033190" cy="742569"/>
             <a:chOff x="1861895" y="2292278"/>
             <a:chExt cx="1033190" cy="742569"/>
           </a:xfrm>
@@ -3340,11 +3313,7 @@
             <a:lstStyle/>
             <a:p>
               <a:pPr algn="ctr"/>
-              <a:endParaRPr lang="en-US" sz="1400">
-                <a:latin typeface="Times New Roman" charset="0"/>
-                <a:ea typeface="Times New Roman" charset="0"/>
-                <a:cs typeface="Times New Roman" charset="0"/>
-              </a:endParaRPr>
+              <a:endParaRPr lang="en-US"/>
             </a:p>
           </p:txBody>
         </p:sp>
@@ -3356,8 +3325,8 @@
           </p:nvSpPr>
           <p:spPr>
             <a:xfrm>
-              <a:off x="1942612" y="2400057"/>
-              <a:ext cx="871755" cy="523220"/>
+              <a:off x="1944539" y="2346087"/>
+              <a:ext cx="871755" cy="584776"/>
             </a:xfrm>
             <a:prstGeom prst="rect">
               <a:avLst/>
@@ -3372,10 +3341,9 @@
             <a:p>
               <a:pPr algn="ctr"/>
               <a:r>
-                <a:rPr lang="en-US" sz="2800" dirty="0">
-                  <a:latin typeface="Times New Roman" charset="0"/>
-                  <a:ea typeface="Times New Roman" charset="0"/>
-                  <a:cs typeface="Times New Roman" charset="0"/>
+                <a:rPr lang="en-US" sz="3200" dirty="0">
+                  <a:latin typeface="Times New Roman"/>
+                  <a:cs typeface="Times New Roman"/>
                 </a:rPr>
                 <a:t>R</a:t>
               </a:r>
@@ -3391,7 +3359,7 @@
         </p:nvGrpSpPr>
         <p:grpSpPr>
           <a:xfrm>
-            <a:off x="3213907" y="2318910"/>
+            <a:off x="3738005" y="2295746"/>
             <a:ext cx="1033190" cy="742569"/>
             <a:chOff x="1861895" y="2292278"/>
             <a:chExt cx="1033190" cy="742569"/>
@@ -3444,11 +3412,7 @@
             <a:lstStyle/>
             <a:p>
               <a:pPr algn="ctr"/>
-              <a:endParaRPr lang="en-US" sz="1400">
-                <a:latin typeface="Times New Roman" charset="0"/>
-                <a:ea typeface="Times New Roman" charset="0"/>
-                <a:cs typeface="Times New Roman" charset="0"/>
-              </a:endParaRPr>
+              <a:endParaRPr lang="en-US"/>
             </a:p>
           </p:txBody>
         </p:sp>
@@ -3460,8 +3424,8 @@
           </p:nvSpPr>
           <p:spPr>
             <a:xfrm>
-              <a:off x="1944539" y="2394197"/>
-              <a:ext cx="871755" cy="523220"/>
+              <a:off x="1944539" y="2346087"/>
+              <a:ext cx="871755" cy="584776"/>
             </a:xfrm>
             <a:prstGeom prst="rect">
               <a:avLst/>
@@ -3476,10 +3440,9 @@
             <a:p>
               <a:pPr algn="ctr"/>
               <a:r>
-                <a:rPr lang="en-US" sz="2800" dirty="0">
-                  <a:latin typeface="Times New Roman" charset="0"/>
-                  <a:ea typeface="Times New Roman" charset="0"/>
-                  <a:cs typeface="Times New Roman" charset="0"/>
+                <a:rPr lang="en-US" sz="3200" dirty="0">
+                  <a:latin typeface="Times New Roman"/>
+                  <a:cs typeface="Times New Roman"/>
                 </a:rPr>
                 <a:t>P</a:t>
               </a:r>
@@ -3495,7 +3458,7 @@
         </p:nvCxnSpPr>
         <p:spPr>
           <a:xfrm>
-            <a:off x="2237182" y="2549912"/>
+            <a:off x="2690598" y="2529040"/>
             <a:ext cx="839467" cy="0"/>
           </a:xfrm>
           <a:prstGeom prst="straightConnector1">
@@ -3530,7 +3493,7 @@
         </p:nvCxnSpPr>
         <p:spPr>
           <a:xfrm>
-            <a:off x="2014357" y="2792782"/>
+            <a:off x="2432310" y="2789058"/>
             <a:ext cx="839467" cy="0"/>
           </a:xfrm>
           <a:prstGeom prst="straightConnector1">
@@ -3570,9 +3533,9 @@
           <p:nvPr/>
         </p:nvCxnSpPr>
         <p:spPr>
-          <a:xfrm flipV="1">
-            <a:off x="4416033" y="2659548"/>
-            <a:ext cx="772636" cy="5559"/>
+          <a:xfrm>
+            <a:off x="4952428" y="2649154"/>
+            <a:ext cx="839467" cy="0"/>
           </a:xfrm>
           <a:prstGeom prst="straightConnector1">
             <a:avLst/>
@@ -3606,8 +3569,8 @@
         </p:nvCxnSpPr>
         <p:spPr>
           <a:xfrm flipH="1" flipV="1">
-            <a:off x="1698142" y="3150095"/>
-            <a:ext cx="2329277" cy="1221850"/>
+            <a:off x="2087905" y="3163989"/>
+            <a:ext cx="1442160" cy="1164016"/>
           </a:xfrm>
           <a:prstGeom prst="straightConnector1">
             <a:avLst/>
@@ -3641,8 +3604,8 @@
         </p:nvCxnSpPr>
         <p:spPr>
           <a:xfrm flipV="1">
-            <a:off x="5292209" y="3150095"/>
-            <a:ext cx="440452" cy="748230"/>
+            <a:off x="5060918" y="3176485"/>
+            <a:ext cx="1579480" cy="1250112"/>
           </a:xfrm>
           <a:prstGeom prst="straightConnector1">
             <a:avLst/>
@@ -3676,8 +3639,8 @@
         </p:nvCxnSpPr>
         <p:spPr>
           <a:xfrm flipH="1">
-            <a:off x="5013155" y="3193429"/>
-            <a:ext cx="458553" cy="729620"/>
+            <a:off x="4952428" y="3176485"/>
+            <a:ext cx="1366823" cy="1008147"/>
           </a:xfrm>
           <a:prstGeom prst="straightConnector1">
             <a:avLst/>
@@ -3710,15 +3673,12 @@
           <p:nvPr/>
         </p:nvSpPr>
         <p:spPr>
-          <a:xfrm rot="19175766">
-            <a:off x="506806" y="1227190"/>
-            <a:ext cx="6375996" cy="6645018"/>
+          <a:xfrm rot="18903209">
+            <a:off x="1095665" y="1166823"/>
+            <a:ext cx="6310861" cy="6415249"/>
           </a:xfrm>
           <a:prstGeom prst="arc">
-            <a:avLst>
-              <a:gd name="adj1" fmla="val 16051718"/>
-              <a:gd name="adj2" fmla="val 21133418"/>
-            </a:avLst>
+            <a:avLst/>
           </a:prstGeom>
           <a:ln w="34925">
             <a:headEnd type="oval"/>
@@ -3756,9 +3716,89 @@
           <p:nvPr/>
         </p:nvCxnSpPr>
         <p:spPr>
-          <a:xfrm flipH="1" flipV="1">
-            <a:off x="268982" y="2540225"/>
-            <a:ext cx="523955" cy="9687"/>
+          <a:xfrm flipH="1">
+            <a:off x="699556" y="2462549"/>
+            <a:ext cx="570408" cy="0"/>
+          </a:xfrm>
+          <a:prstGeom prst="straightConnector1">
+            <a:avLst/>
+          </a:prstGeom>
+          <a:ln w="34925">
+            <a:solidFill>
+              <a:schemeClr val="accent2">
+                <a:lumMod val="75000"/>
+              </a:schemeClr>
+            </a:solidFill>
+            <a:headEnd type="oval" w="med" len="med"/>
+            <a:tailEnd type="triangle" w="lg" len="lg"/>
+          </a:ln>
+          <a:effectLst/>
+        </p:spPr>
+        <p:style>
+          <a:lnRef idx="2">
+            <a:schemeClr val="accent1"/>
+          </a:lnRef>
+          <a:fillRef idx="0">
+            <a:schemeClr val="accent1"/>
+          </a:fillRef>
+          <a:effectRef idx="1">
+            <a:schemeClr val="accent1"/>
+          </a:effectRef>
+          <a:fontRef idx="minor">
+            <a:schemeClr val="tx1"/>
+          </a:fontRef>
+        </p:style>
+      </p:cxnSp>
+      <p:cxnSp>
+        <p:nvCxnSpPr>
+          <p:cNvPr id="42" name="Straight Arrow Connector 41"/>
+          <p:cNvCxnSpPr/>
+          <p:nvPr/>
+        </p:nvCxnSpPr>
+        <p:spPr>
+          <a:xfrm>
+            <a:off x="796417" y="2874832"/>
+            <a:ext cx="538119" cy="0"/>
+          </a:xfrm>
+          <a:prstGeom prst="straightConnector1">
+            <a:avLst/>
+          </a:prstGeom>
+          <a:ln w="34925">
+            <a:solidFill>
+              <a:schemeClr val="accent2">
+                <a:lumMod val="75000"/>
+              </a:schemeClr>
+            </a:solidFill>
+            <a:headEnd type="oval" w="med" len="med"/>
+            <a:tailEnd type="triangle" w="lg" len="lg"/>
+          </a:ln>
+          <a:effectLst/>
+        </p:spPr>
+        <p:style>
+          <a:lnRef idx="2">
+            <a:schemeClr val="accent1"/>
+          </a:lnRef>
+          <a:fillRef idx="0">
+            <a:schemeClr val="accent1"/>
+          </a:fillRef>
+          <a:effectRef idx="1">
+            <a:schemeClr val="accent1"/>
+          </a:effectRef>
+          <a:fontRef idx="minor">
+            <a:schemeClr val="tx1"/>
+          </a:fontRef>
+        </p:style>
+      </p:cxnSp>
+      <p:cxnSp>
+        <p:nvCxnSpPr>
+          <p:cNvPr id="48" name="Straight Arrow Connector 47"/>
+          <p:cNvCxnSpPr/>
+          <p:nvPr/>
+        </p:nvCxnSpPr>
+        <p:spPr>
+          <a:xfrm>
+            <a:off x="7147956" y="2655224"/>
+            <a:ext cx="538119" cy="0"/>
           </a:xfrm>
           <a:prstGeom prst="straightConnector1">
             <a:avLst/>
@@ -3797,7 +3837,7 @@
         </p:nvCxnSpPr>
         <p:spPr>
           <a:xfrm>
-            <a:off x="4747827" y="4860616"/>
+            <a:off x="4247290" y="4852378"/>
             <a:ext cx="0" cy="453223"/>
           </a:xfrm>
           <a:prstGeom prst="straightConnector1">
@@ -3837,8 +3877,8 @@
         </p:nvCxnSpPr>
         <p:spPr>
           <a:xfrm flipV="1">
-            <a:off x="4168306" y="1866162"/>
-            <a:ext cx="0" cy="346908"/>
+            <a:off x="4254600" y="1743423"/>
+            <a:ext cx="0" cy="455466"/>
           </a:xfrm>
           <a:prstGeom prst="straightConnector1">
             <a:avLst/>
@@ -3877,8 +3917,8 @@
         </p:nvSpPr>
         <p:spPr>
           <a:xfrm>
-            <a:off x="3083906" y="981836"/>
-            <a:ext cx="1076241" cy="307777"/>
+            <a:off x="3708977" y="843425"/>
+            <a:ext cx="1076241" cy="353943"/>
           </a:xfrm>
           <a:prstGeom prst="rect">
             <a:avLst/>
@@ -3893,17 +3933,22 @@
           <a:p>
             <a:pPr algn="ctr"/>
             <a:r>
-              <a:rPr lang="en-US" sz="1400" dirty="0">
-                <a:latin typeface="Times New Roman" charset="0"/>
-                <a:ea typeface="Times New Roman" charset="0"/>
-                <a:cs typeface="Times New Roman" charset="0"/>
+              <a:rPr lang="en-US" sz="1500" dirty="0" smtClean="0">
+                <a:latin typeface="Times New Roman"/>
+                <a:cs typeface="Times New Roman"/>
               </a:rPr>
-              <a:t>β(1-ξ)SA</a:t>
-            </a:r>
-            <a:endParaRPr lang="en-US" sz="1400" dirty="0">
-              <a:latin typeface="Times New Roman" charset="0"/>
-              <a:ea typeface="Times New Roman" charset="0"/>
-              <a:cs typeface="Times New Roman" charset="0"/>
+              <a:t>β</a:t>
+            </a:r>
+            <a:r>
+              <a:rPr lang="en-US" sz="1700" dirty="0" smtClean="0">
+                <a:latin typeface="Times New Roman"/>
+                <a:cs typeface="Times New Roman"/>
+              </a:rPr>
+              <a:t>(1-ξ)SA</a:t>
+            </a:r>
+            <a:endParaRPr lang="en-US" sz="1700" dirty="0">
+              <a:latin typeface="Times New Roman"/>
+              <a:cs typeface="Times New Roman"/>
             </a:endParaRPr>
           </a:p>
         </p:txBody>
@@ -3916,8 +3961,8 @@
         </p:nvSpPr>
         <p:spPr>
           <a:xfrm>
-            <a:off x="294283" y="2152914"/>
-            <a:ext cx="721080" cy="307777"/>
+            <a:off x="654578" y="2041521"/>
+            <a:ext cx="721080" cy="353943"/>
           </a:xfrm>
           <a:prstGeom prst="rect">
             <a:avLst/>
@@ -3932,17 +3977,15 @@
           <a:p>
             <a:pPr algn="ctr"/>
             <a:r>
-              <a:rPr lang="en-US" sz="1400" dirty="0" smtClean="0">
-                <a:latin typeface="Times New Roman" charset="0"/>
-                <a:ea typeface="Times New Roman" charset="0"/>
-                <a:cs typeface="Times New Roman" charset="0"/>
+              <a:rPr lang="en-US" sz="1700" dirty="0" smtClean="0">
+                <a:latin typeface="Times New Roman"/>
+                <a:cs typeface="Times New Roman"/>
               </a:rPr>
               <a:t>𝜇S</a:t>
             </a:r>
-            <a:endParaRPr lang="en-US" sz="1400" dirty="0">
-              <a:latin typeface="Times New Roman" charset="0"/>
-              <a:ea typeface="Times New Roman" charset="0"/>
-              <a:cs typeface="Times New Roman" charset="0"/>
+            <a:endParaRPr lang="en-US" sz="1700" dirty="0">
+              <a:latin typeface="Times New Roman"/>
+              <a:cs typeface="Times New Roman"/>
             </a:endParaRPr>
           </a:p>
         </p:txBody>
@@ -3955,8 +3998,8 @@
         </p:nvSpPr>
         <p:spPr>
           <a:xfrm>
-            <a:off x="2227988" y="2159714"/>
-            <a:ext cx="839466" cy="307777"/>
+            <a:off x="2690598" y="2151060"/>
+            <a:ext cx="839466" cy="353943"/>
           </a:xfrm>
           <a:prstGeom prst="rect">
             <a:avLst/>
@@ -3971,17 +4014,15 @@
           <a:p>
             <a:pPr algn="ctr"/>
             <a:r>
-              <a:rPr lang="en-US" sz="1400" dirty="0" smtClean="0">
-                <a:latin typeface="Times New Roman" charset="0"/>
-                <a:ea typeface="Times New Roman" charset="0"/>
-                <a:cs typeface="Times New Roman" charset="0"/>
+              <a:rPr lang="en-US" sz="1700" dirty="0" smtClean="0">
+                <a:latin typeface="Times New Roman"/>
+                <a:cs typeface="Times New Roman"/>
               </a:rPr>
               <a:t>αS</a:t>
             </a:r>
-            <a:endParaRPr lang="en-US" sz="1400" dirty="0">
-              <a:latin typeface="Times New Roman" charset="0"/>
-              <a:ea typeface="Times New Roman" charset="0"/>
-              <a:cs typeface="Times New Roman" charset="0"/>
+            <a:endParaRPr lang="en-US" sz="1700" dirty="0">
+              <a:latin typeface="Times New Roman"/>
+              <a:cs typeface="Times New Roman"/>
             </a:endParaRPr>
           </a:p>
         </p:txBody>
@@ -3994,8 +4035,8 @@
         </p:nvSpPr>
         <p:spPr>
           <a:xfrm>
-            <a:off x="2234517" y="2840702"/>
-            <a:ext cx="839467" cy="307777"/>
+            <a:off x="2690597" y="2794425"/>
+            <a:ext cx="839467" cy="353943"/>
           </a:xfrm>
           <a:prstGeom prst="rect">
             <a:avLst/>
@@ -4010,17 +4051,15 @@
           <a:p>
             <a:pPr algn="ctr"/>
             <a:r>
-              <a:rPr lang="en-US" sz="1400" dirty="0" smtClean="0">
-                <a:latin typeface="Times New Roman" charset="0"/>
-                <a:ea typeface="Times New Roman" charset="0"/>
-                <a:cs typeface="Times New Roman" charset="0"/>
+              <a:rPr lang="en-US" sz="1700" dirty="0" smtClean="0">
+                <a:latin typeface="Times New Roman"/>
+                <a:cs typeface="Times New Roman"/>
               </a:rPr>
               <a:t>εP</a:t>
             </a:r>
-            <a:endParaRPr lang="en-US" sz="1400" dirty="0">
-              <a:latin typeface="Times New Roman" charset="0"/>
-              <a:ea typeface="Times New Roman" charset="0"/>
-              <a:cs typeface="Times New Roman" charset="0"/>
+            <a:endParaRPr lang="en-US" sz="1700" dirty="0">
+              <a:latin typeface="Times New Roman"/>
+              <a:cs typeface="Times New Roman"/>
             </a:endParaRPr>
           </a:p>
         </p:txBody>
@@ -4033,8 +4072,8 @@
         </p:nvSpPr>
         <p:spPr>
           <a:xfrm>
-            <a:off x="4375896" y="2375797"/>
-            <a:ext cx="839466" cy="307777"/>
+            <a:off x="4920142" y="2272375"/>
+            <a:ext cx="839466" cy="353943"/>
           </a:xfrm>
           <a:prstGeom prst="rect">
             <a:avLst/>
@@ -4049,17 +4088,15 @@
           <a:p>
             <a:pPr algn="ctr"/>
             <a:r>
-              <a:rPr lang="en-US" sz="1400" dirty="0" smtClean="0">
-                <a:latin typeface="Times New Roman" charset="0"/>
-                <a:ea typeface="Times New Roman" charset="0"/>
-                <a:cs typeface="Times New Roman" charset="0"/>
+              <a:rPr lang="en-US" sz="1700" dirty="0" smtClean="0">
+                <a:latin typeface="Times New Roman"/>
+                <a:cs typeface="Times New Roman"/>
               </a:rPr>
               <a:t>γP</a:t>
             </a:r>
-            <a:endParaRPr lang="en-US" sz="1400" dirty="0">
-              <a:latin typeface="Times New Roman" charset="0"/>
-              <a:ea typeface="Times New Roman" charset="0"/>
-              <a:cs typeface="Times New Roman" charset="0"/>
+            <a:endParaRPr lang="en-US" sz="1700" dirty="0">
+              <a:latin typeface="Times New Roman"/>
+              <a:cs typeface="Times New Roman"/>
             </a:endParaRPr>
           </a:p>
         </p:txBody>
@@ -4072,8 +4109,8 @@
         </p:nvSpPr>
         <p:spPr>
           <a:xfrm>
-            <a:off x="4533459" y="3365864"/>
-            <a:ext cx="839466" cy="307777"/>
+            <a:off x="5125490" y="3253438"/>
+            <a:ext cx="839466" cy="353943"/>
           </a:xfrm>
           <a:prstGeom prst="rect">
             <a:avLst/>
@@ -4088,17 +4125,15 @@
           <a:p>
             <a:pPr algn="ctr"/>
             <a:r>
-              <a:rPr lang="en-US" sz="1400" dirty="0" smtClean="0">
-                <a:latin typeface="Times New Roman" charset="0"/>
-                <a:ea typeface="Times New Roman" charset="0"/>
-                <a:cs typeface="Times New Roman" charset="0"/>
+              <a:rPr lang="en-US" sz="1700" dirty="0" smtClean="0">
+                <a:latin typeface="Times New Roman"/>
+                <a:cs typeface="Times New Roman"/>
               </a:rPr>
               <a:t>ζA</a:t>
             </a:r>
-            <a:endParaRPr lang="en-US" sz="1400" dirty="0">
-              <a:latin typeface="Times New Roman" charset="0"/>
-              <a:ea typeface="Times New Roman" charset="0"/>
-              <a:cs typeface="Times New Roman" charset="0"/>
+            <a:endParaRPr lang="en-US" sz="1700" dirty="0">
+              <a:latin typeface="Times New Roman"/>
+              <a:cs typeface="Times New Roman"/>
             </a:endParaRPr>
           </a:p>
         </p:txBody>
@@ -4111,8 +4146,8 @@
         </p:nvSpPr>
         <p:spPr>
           <a:xfrm>
-            <a:off x="5188669" y="3390588"/>
-            <a:ext cx="1160612" cy="307777"/>
+            <a:off x="5759608" y="3770543"/>
+            <a:ext cx="1160612" cy="353943"/>
           </a:xfrm>
           <a:prstGeom prst="rect">
             <a:avLst/>
@@ -4127,42 +4162,19 @@
           <a:p>
             <a:pPr algn="ctr"/>
             <a:r>
-              <a:rPr lang="en-US" sz="1400" dirty="0" smtClean="0">
-                <a:latin typeface="Times New Roman" charset="0"/>
-                <a:ea typeface="Times New Roman" charset="0"/>
-                <a:cs typeface="Times New Roman" charset="0"/>
+              <a:rPr lang="en-US" sz="1700" dirty="0" smtClean="0">
+                <a:latin typeface="Times New Roman"/>
+                <a:cs typeface="Times New Roman"/>
               </a:rPr>
-              <a:t> </a:t>
-            </a:r>
-            <a:r>
-              <a:rPr lang="en-US" sz="1400" dirty="0" err="1" smtClean="0">
-                <a:latin typeface="Times New Roman" charset="0"/>
-                <a:ea typeface="Times New Roman" charset="0"/>
-                <a:cs typeface="Times New Roman" charset="0"/>
-              </a:rPr>
-              <a:t>σ</a:t>
-            </a:r>
-            <a:r>
-              <a:rPr lang="en-US" sz="1400" baseline="-25000" dirty="0" err="1" smtClean="0">
-                <a:latin typeface="Times New Roman" charset="0"/>
-                <a:ea typeface="Times New Roman" charset="0"/>
-                <a:cs typeface="Times New Roman" charset="0"/>
-              </a:rPr>
-              <a:t>A</a:t>
-            </a:r>
-            <a:r>
-              <a:rPr lang="en-US" sz="1400" dirty="0" err="1" smtClean="0">
-                <a:latin typeface="Times New Roman" charset="0"/>
-                <a:ea typeface="Times New Roman" charset="0"/>
-                <a:cs typeface="Times New Roman" charset="0"/>
+              <a:t>𝜈RA, σ</a:t>
+            </a:r>
+            <a:r>
+              <a:rPr lang="en-US" sz="1700" dirty="0">
+                <a:latin typeface="Times New Roman"/>
+                <a:cs typeface="Times New Roman"/>
               </a:rPr>
               <a:t>R</a:t>
             </a:r>
-            <a:endParaRPr lang="en-US" sz="1400" dirty="0">
-              <a:latin typeface="Times New Roman" charset="0"/>
-              <a:ea typeface="Times New Roman" charset="0"/>
-              <a:cs typeface="Times New Roman" charset="0"/>
-            </a:endParaRPr>
           </a:p>
         </p:txBody>
       </p:sp>
@@ -4174,8 +4186,8 @@
         </p:nvSpPr>
         <p:spPr>
           <a:xfrm>
-            <a:off x="2424385" y="3782999"/>
-            <a:ext cx="839466" cy="307777"/>
+            <a:off x="2281627" y="3744123"/>
+            <a:ext cx="839466" cy="353943"/>
           </a:xfrm>
           <a:prstGeom prst="rect">
             <a:avLst/>
@@ -4190,17 +4202,15 @@
           <a:p>
             <a:pPr algn="ctr"/>
             <a:r>
-              <a:rPr lang="en-US" sz="1400" dirty="0" smtClean="0">
-                <a:latin typeface="Times New Roman" charset="0"/>
-                <a:ea typeface="Times New Roman" charset="0"/>
-                <a:cs typeface="Times New Roman" charset="0"/>
+              <a:rPr lang="en-US" sz="1700" dirty="0" smtClean="0">
+                <a:latin typeface="Times New Roman"/>
+                <a:cs typeface="Times New Roman"/>
               </a:rPr>
               <a:t>δR</a:t>
             </a:r>
-            <a:endParaRPr lang="en-US" sz="1400" dirty="0">
-              <a:latin typeface="Times New Roman" charset="0"/>
-              <a:ea typeface="Times New Roman" charset="0"/>
-              <a:cs typeface="Times New Roman" charset="0"/>
+            <a:endParaRPr lang="en-US" sz="1700" dirty="0">
+              <a:latin typeface="Times New Roman"/>
+              <a:cs typeface="Times New Roman"/>
             </a:endParaRPr>
           </a:p>
         </p:txBody>
@@ -4213,8 +4223,8 @@
         </p:nvSpPr>
         <p:spPr>
           <a:xfrm>
-            <a:off x="4140799" y="1932085"/>
-            <a:ext cx="550468" cy="307777"/>
+            <a:off x="4103925" y="1501880"/>
+            <a:ext cx="721080" cy="353943"/>
           </a:xfrm>
           <a:prstGeom prst="rect">
             <a:avLst/>
@@ -4229,17 +4239,15 @@
           <a:p>
             <a:pPr algn="ctr"/>
             <a:r>
-              <a:rPr lang="en-US" sz="1400" dirty="0" smtClean="0">
-                <a:latin typeface="Times New Roman" charset="0"/>
-                <a:ea typeface="Times New Roman" charset="0"/>
-                <a:cs typeface="Times New Roman" charset="0"/>
+              <a:rPr lang="en-US" sz="1700" dirty="0" smtClean="0">
+                <a:latin typeface="Times New Roman"/>
+                <a:cs typeface="Times New Roman"/>
               </a:rPr>
               <a:t>𝜇P</a:t>
             </a:r>
-            <a:endParaRPr lang="en-US" sz="1400" dirty="0">
-              <a:latin typeface="Times New Roman" charset="0"/>
-              <a:ea typeface="Times New Roman" charset="0"/>
-              <a:cs typeface="Times New Roman" charset="0"/>
+            <a:endParaRPr lang="en-US" sz="1700" dirty="0">
+              <a:latin typeface="Times New Roman"/>
+              <a:cs typeface="Times New Roman"/>
             </a:endParaRPr>
           </a:p>
         </p:txBody>
@@ -4252,8 +4260,8 @@
         </p:nvSpPr>
         <p:spPr>
           <a:xfrm>
-            <a:off x="4152027" y="4879715"/>
-            <a:ext cx="721080" cy="307777"/>
+            <a:off x="3694953" y="5171677"/>
+            <a:ext cx="721080" cy="353943"/>
           </a:xfrm>
           <a:prstGeom prst="rect">
             <a:avLst/>
@@ -4268,17 +4276,15 @@
           <a:p>
             <a:pPr algn="ctr"/>
             <a:r>
-              <a:rPr lang="en-US" sz="1400" dirty="0" smtClean="0">
-                <a:latin typeface="Times New Roman" charset="0"/>
-                <a:ea typeface="Times New Roman" charset="0"/>
-                <a:cs typeface="Times New Roman" charset="0"/>
+              <a:rPr lang="en-US" sz="1700" dirty="0" smtClean="0">
+                <a:latin typeface="Times New Roman"/>
+                <a:cs typeface="Times New Roman"/>
               </a:rPr>
               <a:t>𝜇R</a:t>
             </a:r>
-            <a:endParaRPr lang="en-US" sz="1400" dirty="0">
-              <a:latin typeface="Times New Roman" charset="0"/>
-              <a:ea typeface="Times New Roman" charset="0"/>
-              <a:cs typeface="Times New Roman" charset="0"/>
+            <a:endParaRPr lang="en-US" sz="1700" dirty="0">
+              <a:latin typeface="Times New Roman"/>
+              <a:cs typeface="Times New Roman"/>
             </a:endParaRPr>
           </a:p>
         </p:txBody>
@@ -4291,8 +4297,8 @@
         </p:nvSpPr>
         <p:spPr>
           <a:xfrm>
-            <a:off x="6009969" y="1935202"/>
-            <a:ext cx="721080" cy="307777"/>
+            <a:off x="7347059" y="2240089"/>
+            <a:ext cx="721080" cy="353943"/>
           </a:xfrm>
           <a:prstGeom prst="rect">
             <a:avLst/>
@@ -4307,33 +4313,15 @@
           <a:p>
             <a:pPr algn="ctr"/>
             <a:r>
-              <a:rPr lang="en-US" sz="1400" dirty="0">
-                <a:latin typeface="Times New Roman" charset="0"/>
-                <a:ea typeface="Times New Roman" charset="0"/>
-                <a:cs typeface="Times New Roman" charset="0"/>
+              <a:rPr lang="en-US" sz="1700" dirty="0" smtClean="0">
+                <a:latin typeface="Times New Roman"/>
+                <a:cs typeface="Times New Roman"/>
               </a:rPr>
-              <a:t>𝜇 </a:t>
-            </a:r>
-            <a:r>
-              <a:rPr lang="en-US" sz="1400" dirty="0" smtClean="0">
-                <a:latin typeface="Times New Roman" charset="0"/>
-                <a:ea typeface="Times New Roman" charset="0"/>
-                <a:cs typeface="Times New Roman" charset="0"/>
-              </a:rPr>
-              <a:t>+𝜇</a:t>
-            </a:r>
-            <a:r>
-              <a:rPr lang="en-US" sz="1400" baseline="-25000" dirty="0" smtClean="0">
-                <a:latin typeface="Times New Roman" charset="0"/>
-                <a:ea typeface="Times New Roman" charset="0"/>
-                <a:cs typeface="Times New Roman" charset="0"/>
-              </a:rPr>
-              <a:t>A</a:t>
-            </a:r>
-            <a:endParaRPr lang="en-US" sz="1400" dirty="0">
-              <a:latin typeface="Times New Roman" charset="0"/>
-              <a:ea typeface="Times New Roman" charset="0"/>
-              <a:cs typeface="Times New Roman" charset="0"/>
+              <a:t>𝜇*A</a:t>
+            </a:r>
+            <a:endParaRPr lang="en-US" sz="1700" dirty="0">
+              <a:latin typeface="Times New Roman"/>
+              <a:cs typeface="Times New Roman"/>
             </a:endParaRPr>
           </a:p>
         </p:txBody>
@@ -4346,8 +4334,8 @@
         </p:nvSpPr>
         <p:spPr>
           <a:xfrm>
-            <a:off x="3255802" y="1280154"/>
-            <a:ext cx="721080" cy="307777"/>
+            <a:off x="3886750" y="1133652"/>
+            <a:ext cx="721080" cy="353943"/>
           </a:xfrm>
           <a:prstGeom prst="rect">
             <a:avLst/>
@@ -4362,25 +4350,22 @@
           <a:p>
             <a:pPr algn="ctr"/>
             <a:r>
-              <a:rPr lang="en-US" sz="1400" dirty="0" smtClean="0">
-                <a:latin typeface="Times New Roman" charset="0"/>
-                <a:ea typeface="Times New Roman" charset="0"/>
-                <a:cs typeface="Times New Roman" charset="0"/>
+              <a:rPr lang="en-US" sz="1500" dirty="0" smtClean="0">
+                <a:latin typeface="Times New Roman"/>
+                <a:cs typeface="Times New Roman"/>
               </a:rPr>
               <a:t>β</a:t>
             </a:r>
             <a:r>
-              <a:rPr lang="en-US" sz="1400" dirty="0" err="1" smtClean="0">
-                <a:latin typeface="Times New Roman" charset="0"/>
-                <a:ea typeface="Times New Roman" charset="0"/>
-                <a:cs typeface="Times New Roman" charset="0"/>
+              <a:rPr lang="en-US" sz="1700" dirty="0" err="1" smtClean="0">
+                <a:latin typeface="Times New Roman"/>
+                <a:cs typeface="Times New Roman"/>
               </a:rPr>
               <a:t>ξSP</a:t>
             </a:r>
-            <a:endParaRPr lang="en-US" sz="1400" dirty="0">
-              <a:latin typeface="Times New Roman" charset="0"/>
-              <a:ea typeface="Times New Roman" charset="0"/>
-              <a:cs typeface="Times New Roman" charset="0"/>
+            <a:endParaRPr lang="en-US" sz="1700" dirty="0">
+              <a:latin typeface="Times New Roman"/>
+              <a:cs typeface="Times New Roman"/>
             </a:endParaRPr>
           </a:p>
         </p:txBody>
@@ -4393,8 +4378,8 @@
         </p:nvSpPr>
         <p:spPr>
           <a:xfrm>
-            <a:off x="-173273" y="3013558"/>
-            <a:ext cx="1645117" cy="769441"/>
+            <a:off x="190501" y="2999513"/>
+            <a:ext cx="1651000" cy="353943"/>
           </a:xfrm>
           <a:prstGeom prst="rect">
             <a:avLst/>
@@ -4409,815 +4394,12 @@
           <a:p>
             <a:pPr algn="ctr"/>
             <a:r>
-              <a:rPr lang="en-US" sz="1400" dirty="0">
+              <a:rPr lang="en-US" sz="1700" dirty="0">
                 <a:latin typeface="Times New Roman"/>
                 <a:cs typeface="Times New Roman"/>
               </a:rPr>
-              <a:t>𝜇(</a:t>
-            </a:r>
-            <a:r>
-              <a:rPr lang="en-US" sz="1400" dirty="0" smtClean="0">
-                <a:latin typeface="Times New Roman"/>
-                <a:cs typeface="Times New Roman"/>
-              </a:rPr>
-              <a:t>S+P+R+A+H) </a:t>
-            </a:r>
-            <a:endParaRPr lang="en-US" sz="1400" dirty="0" smtClean="0">
-              <a:latin typeface="Times New Roman"/>
-              <a:cs typeface="Times New Roman"/>
-            </a:endParaRPr>
-          </a:p>
-          <a:p>
-            <a:pPr algn="ctr"/>
-            <a:r>
-              <a:rPr lang="en-US" sz="1400" dirty="0" smtClean="0">
-                <a:latin typeface="Times New Roman"/>
-                <a:cs typeface="Times New Roman"/>
-              </a:rPr>
-              <a:t>+</a:t>
-            </a:r>
-            <a:r>
-              <a:rPr lang="en-US" sz="1400" dirty="0" smtClean="0">
-                <a:latin typeface="Times New Roman"/>
-                <a:cs typeface="Times New Roman"/>
-              </a:rPr>
-              <a:t>𝜇</a:t>
-            </a:r>
-            <a:r>
-              <a:rPr lang="en-US" sz="1400" baseline="-25000" dirty="0" smtClean="0">
-                <a:latin typeface="Times New Roman"/>
-                <a:cs typeface="Times New Roman"/>
-              </a:rPr>
-              <a:t>A</a:t>
-            </a:r>
-            <a:r>
-              <a:rPr lang="en-US" sz="1400" dirty="0" smtClean="0">
-                <a:latin typeface="Times New Roman"/>
-                <a:cs typeface="Times New Roman"/>
-              </a:rPr>
-              <a:t>+𝜇</a:t>
-            </a:r>
-            <a:r>
-              <a:rPr lang="en-US" sz="1400" baseline="-25000" dirty="0" smtClean="0">
-                <a:latin typeface="Times New Roman"/>
-                <a:cs typeface="Times New Roman"/>
-              </a:rPr>
-              <a:t>H</a:t>
-            </a:r>
-            <a:endParaRPr lang="en-US" sz="1400" dirty="0">
-              <a:latin typeface="Times New Roman"/>
-              <a:cs typeface="Times New Roman"/>
-            </a:endParaRPr>
-          </a:p>
-          <a:p>
-            <a:pPr algn="ctr"/>
-            <a:endParaRPr lang="en-US" sz="1600" dirty="0">
-              <a:latin typeface="Times New Roman"/>
-              <a:cs typeface="Times New Roman"/>
-            </a:endParaRPr>
-          </a:p>
-        </p:txBody>
-      </p:sp>
-      <p:sp>
-        <p:nvSpPr>
-          <p:cNvPr id="41" name="Rectangle 40"/>
-          <p:cNvSpPr/>
-          <p:nvPr/>
-        </p:nvSpPr>
-        <p:spPr>
-          <a:xfrm>
-            <a:off x="7213942" y="2307723"/>
-            <a:ext cx="1033190" cy="742569"/>
-          </a:xfrm>
-          <a:prstGeom prst="rect">
-            <a:avLst/>
-          </a:prstGeom>
-          <a:solidFill>
-            <a:schemeClr val="accent4">
-              <a:lumMod val="20000"/>
-              <a:lumOff val="80000"/>
-            </a:schemeClr>
-          </a:solidFill>
-          <a:ln w="31750">
-            <a:solidFill>
-              <a:schemeClr val="tx1"/>
-            </a:solidFill>
-          </a:ln>
-          <a:effectLst/>
-        </p:spPr>
-        <p:style>
-          <a:lnRef idx="1">
-            <a:schemeClr val="accent1"/>
-          </a:lnRef>
-          <a:fillRef idx="3">
-            <a:schemeClr val="accent1"/>
-          </a:fillRef>
-          <a:effectRef idx="2">
-            <a:schemeClr val="accent1"/>
-          </a:effectRef>
-          <a:fontRef idx="minor">
-            <a:schemeClr val="lt1"/>
-          </a:fontRef>
-        </p:style>
-        <p:txBody>
-          <a:bodyPr rtlCol="0" anchor="ctr"/>
-          <a:lstStyle/>
-          <a:p>
-            <a:pPr algn="ctr"/>
-            <a:endParaRPr lang="en-US" sz="1400">
-              <a:latin typeface="Times New Roman" charset="0"/>
-              <a:ea typeface="Times New Roman" charset="0"/>
-              <a:cs typeface="Times New Roman" charset="0"/>
-            </a:endParaRPr>
-          </a:p>
-        </p:txBody>
-      </p:sp>
-      <p:sp>
-        <p:nvSpPr>
-          <p:cNvPr id="43" name="TextBox 42"/>
-          <p:cNvSpPr txBox="1"/>
-          <p:nvPr/>
-        </p:nvSpPr>
-        <p:spPr>
-          <a:xfrm>
-            <a:off x="7307439" y="2410229"/>
-            <a:ext cx="871755" cy="523220"/>
-          </a:xfrm>
-          <a:prstGeom prst="rect">
-            <a:avLst/>
-          </a:prstGeom>
-          <a:solidFill>
-            <a:schemeClr val="accent4">
-              <a:lumMod val="20000"/>
-              <a:lumOff val="80000"/>
-            </a:schemeClr>
-          </a:solidFill>
-        </p:spPr>
-        <p:txBody>
-          <a:bodyPr wrap="square" rtlCol="0">
-            <a:spAutoFit/>
-          </a:bodyPr>
-          <a:lstStyle/>
-          <a:p>
-            <a:pPr algn="ctr"/>
-            <a:r>
-              <a:rPr lang="en-US" sz="2800" dirty="0">
-                <a:latin typeface="Times New Roman" charset="0"/>
-                <a:ea typeface="Times New Roman" charset="0"/>
-                <a:cs typeface="Times New Roman" charset="0"/>
-              </a:rPr>
-              <a:t>H</a:t>
-            </a:r>
-          </a:p>
-        </p:txBody>
-      </p:sp>
-      <p:cxnSp>
-        <p:nvCxnSpPr>
-          <p:cNvPr id="45" name="Straight Arrow Connector 44"/>
-          <p:cNvCxnSpPr/>
-          <p:nvPr/>
-        </p:nvCxnSpPr>
-        <p:spPr>
-          <a:xfrm flipV="1">
-            <a:off x="6467502" y="2642275"/>
-            <a:ext cx="649631" cy="17274"/>
-          </a:xfrm>
-          <a:prstGeom prst="straightConnector1">
-            <a:avLst/>
-          </a:prstGeom>
-          <a:ln w="34925">
-            <a:headEnd type="oval" w="med" len="med"/>
-            <a:tailEnd type="triangle" w="lg" len="lg"/>
-          </a:ln>
-          <a:effectLst/>
-        </p:spPr>
-        <p:style>
-          <a:lnRef idx="2">
-            <a:schemeClr val="accent1"/>
-          </a:lnRef>
-          <a:fillRef idx="0">
-            <a:schemeClr val="accent1"/>
-          </a:fillRef>
-          <a:effectRef idx="1">
-            <a:schemeClr val="accent1"/>
-          </a:effectRef>
-          <a:fontRef idx="minor">
-            <a:schemeClr val="tx1"/>
-          </a:fontRef>
-        </p:style>
-      </p:cxnSp>
-      <p:cxnSp>
-        <p:nvCxnSpPr>
-          <p:cNvPr id="50" name="Straight Arrow Connector 49"/>
-          <p:cNvCxnSpPr/>
-          <p:nvPr/>
-        </p:nvCxnSpPr>
-        <p:spPr>
-          <a:xfrm>
-            <a:off x="8394058" y="2642275"/>
-            <a:ext cx="547042" cy="1162"/>
-          </a:xfrm>
-          <a:prstGeom prst="straightConnector1">
-            <a:avLst/>
-          </a:prstGeom>
-          <a:ln w="34925">
-            <a:solidFill>
-              <a:schemeClr val="accent2">
-                <a:lumMod val="75000"/>
-              </a:schemeClr>
-            </a:solidFill>
-            <a:headEnd type="oval" w="med" len="med"/>
-            <a:tailEnd type="triangle" w="lg" len="lg"/>
-          </a:ln>
-          <a:effectLst/>
-        </p:spPr>
-        <p:style>
-          <a:lnRef idx="2">
-            <a:schemeClr val="accent1"/>
-          </a:lnRef>
-          <a:fillRef idx="0">
-            <a:schemeClr val="accent1"/>
-          </a:fillRef>
-          <a:effectRef idx="1">
-            <a:schemeClr val="accent1"/>
-          </a:effectRef>
-          <a:fontRef idx="minor">
-            <a:schemeClr val="tx1"/>
-          </a:fontRef>
-        </p:style>
-      </p:cxnSp>
-      <p:cxnSp>
-        <p:nvCxnSpPr>
-          <p:cNvPr id="52" name="Straight Arrow Connector 51"/>
-          <p:cNvCxnSpPr/>
-          <p:nvPr/>
-        </p:nvCxnSpPr>
-        <p:spPr>
-          <a:xfrm flipV="1">
-            <a:off x="371372" y="2866726"/>
-            <a:ext cx="517758" cy="9688"/>
-          </a:xfrm>
-          <a:prstGeom prst="straightConnector1">
-            <a:avLst/>
-          </a:prstGeom>
-          <a:ln w="34925">
-            <a:solidFill>
-              <a:schemeClr val="accent2">
-                <a:lumMod val="75000"/>
-              </a:schemeClr>
-            </a:solidFill>
-            <a:headEnd type="oval" w="med" len="med"/>
-            <a:tailEnd type="triangle" w="lg" len="lg"/>
-          </a:ln>
-          <a:effectLst/>
-        </p:spPr>
-        <p:style>
-          <a:lnRef idx="2">
-            <a:schemeClr val="accent1"/>
-          </a:lnRef>
-          <a:fillRef idx="0">
-            <a:schemeClr val="accent1"/>
-          </a:fillRef>
-          <a:effectRef idx="1">
-            <a:schemeClr val="accent1"/>
-          </a:effectRef>
-          <a:fontRef idx="minor">
-            <a:schemeClr val="tx1"/>
-          </a:fontRef>
-        </p:style>
-      </p:cxnSp>
-      <p:sp>
-        <p:nvSpPr>
-          <p:cNvPr id="53" name="Arc 52"/>
-          <p:cNvSpPr/>
-          <p:nvPr/>
-        </p:nvSpPr>
-        <p:spPr>
-          <a:xfrm rot="19175766">
-            <a:off x="2635321" y="1299700"/>
-            <a:ext cx="6375996" cy="6645018"/>
-          </a:xfrm>
-          <a:prstGeom prst="arc">
-            <a:avLst>
-              <a:gd name="adj1" fmla="val 16051718"/>
-              <a:gd name="adj2" fmla="val 21038730"/>
-            </a:avLst>
-          </a:prstGeom>
-          <a:ln w="34925">
-            <a:headEnd type="oval"/>
-            <a:tailEnd type="triangle" w="lg" len="lg"/>
-          </a:ln>
-          <a:effectLst/>
-        </p:spPr>
-        <p:style>
-          <a:lnRef idx="2">
-            <a:schemeClr val="accent1"/>
-          </a:lnRef>
-          <a:fillRef idx="0">
-            <a:schemeClr val="accent1"/>
-          </a:fillRef>
-          <a:effectRef idx="1">
-            <a:schemeClr val="accent1"/>
-          </a:effectRef>
-          <a:fontRef idx="minor">
-            <a:schemeClr val="tx1"/>
-          </a:fontRef>
-        </p:style>
-        <p:txBody>
-          <a:bodyPr rtlCol="0" anchor="ctr"/>
-          <a:lstStyle/>
-          <a:p>
-            <a:pPr algn="ctr"/>
-            <a:endParaRPr lang="en-US"/>
-          </a:p>
-        </p:txBody>
-      </p:sp>
-      <p:sp>
-        <p:nvSpPr>
-          <p:cNvPr id="70" name="TextBox 69"/>
-          <p:cNvSpPr txBox="1"/>
-          <p:nvPr/>
-        </p:nvSpPr>
-        <p:spPr>
-          <a:xfrm>
-            <a:off x="8276002" y="2715947"/>
-            <a:ext cx="721080" cy="307777"/>
-          </a:xfrm>
-          <a:prstGeom prst="rect">
-            <a:avLst/>
-          </a:prstGeom>
-          <a:noFill/>
-        </p:spPr>
-        <p:txBody>
-          <a:bodyPr wrap="square" rtlCol="0">
-            <a:spAutoFit/>
-          </a:bodyPr>
-          <a:lstStyle/>
-          <a:p>
-            <a:pPr algn="ctr"/>
-            <a:r>
-              <a:rPr lang="en-US" sz="1400" dirty="0">
-                <a:latin typeface="Times New Roman" charset="0"/>
-                <a:ea typeface="Times New Roman" charset="0"/>
-                <a:cs typeface="Times New Roman" charset="0"/>
-              </a:rPr>
-              <a:t>𝜇 </a:t>
-            </a:r>
-            <a:r>
-              <a:rPr lang="en-US" sz="1400" dirty="0" smtClean="0">
-                <a:latin typeface="Times New Roman" charset="0"/>
-                <a:ea typeface="Times New Roman" charset="0"/>
-                <a:cs typeface="Times New Roman" charset="0"/>
-              </a:rPr>
-              <a:t>+𝜇</a:t>
-            </a:r>
-            <a:r>
-              <a:rPr lang="en-US" sz="1400" baseline="-25000" dirty="0">
-                <a:latin typeface="Times New Roman" charset="0"/>
-                <a:ea typeface="Times New Roman" charset="0"/>
-                <a:cs typeface="Times New Roman" charset="0"/>
-              </a:rPr>
-              <a:t>H</a:t>
-            </a:r>
-            <a:endParaRPr lang="en-US" sz="1400" dirty="0">
-              <a:latin typeface="Times New Roman" charset="0"/>
-              <a:ea typeface="Times New Roman" charset="0"/>
-              <a:cs typeface="Times New Roman" charset="0"/>
-            </a:endParaRPr>
-          </a:p>
-        </p:txBody>
-      </p:sp>
-      <p:sp>
-        <p:nvSpPr>
-          <p:cNvPr id="72" name="Arc 71"/>
-          <p:cNvSpPr/>
-          <p:nvPr/>
-        </p:nvSpPr>
-        <p:spPr>
-          <a:xfrm rot="19175766">
-            <a:off x="627268" y="305942"/>
-            <a:ext cx="8221918" cy="8487514"/>
-          </a:xfrm>
-          <a:prstGeom prst="arc">
-            <a:avLst>
-              <a:gd name="adj1" fmla="val 15338255"/>
-              <a:gd name="adj2" fmla="val 294909"/>
-            </a:avLst>
-          </a:prstGeom>
-          <a:ln w="34925">
-            <a:headEnd type="oval"/>
-            <a:tailEnd type="triangle" w="lg" len="lg"/>
-          </a:ln>
-          <a:effectLst/>
-        </p:spPr>
-        <p:style>
-          <a:lnRef idx="2">
-            <a:schemeClr val="accent1"/>
-          </a:lnRef>
-          <a:fillRef idx="0">
-            <a:schemeClr val="accent1"/>
-          </a:fillRef>
-          <a:effectRef idx="1">
-            <a:schemeClr val="accent1"/>
-          </a:effectRef>
-          <a:fontRef idx="minor">
-            <a:schemeClr val="tx1"/>
-          </a:fontRef>
-        </p:style>
-        <p:txBody>
-          <a:bodyPr rtlCol="0" anchor="ctr"/>
-          <a:lstStyle/>
-          <a:p>
-            <a:pPr algn="ctr"/>
-            <a:endParaRPr lang="en-US"/>
-          </a:p>
-        </p:txBody>
-      </p:sp>
-      <p:sp>
-        <p:nvSpPr>
-          <p:cNvPr id="24" name="Rectangle 23"/>
-          <p:cNvSpPr/>
-          <p:nvPr/>
-        </p:nvSpPr>
-        <p:spPr>
-          <a:xfrm>
-            <a:off x="4232644" y="72543"/>
-            <a:ext cx="753732" cy="307777"/>
-          </a:xfrm>
-          <a:prstGeom prst="rect">
-            <a:avLst/>
-          </a:prstGeom>
-        </p:spPr>
-        <p:txBody>
-          <a:bodyPr wrap="none">
-            <a:spAutoFit/>
-          </a:bodyPr>
-          <a:lstStyle/>
-          <a:p>
-            <a:pPr algn="ctr"/>
-            <a:r>
-              <a:rPr lang="en-US" sz="1400" dirty="0" smtClean="0">
-                <a:latin typeface="Times New Roman" charset="0"/>
-                <a:ea typeface="Times New Roman" charset="0"/>
-                <a:cs typeface="Times New Roman" charset="0"/>
-              </a:rPr>
-              <a:t>    𝜃</a:t>
-            </a:r>
-            <a:r>
-              <a:rPr lang="en-US" sz="1400" baseline="-25000" dirty="0" smtClean="0">
-                <a:latin typeface="Times New Roman" charset="0"/>
-                <a:ea typeface="Times New Roman" charset="0"/>
-                <a:cs typeface="Times New Roman" charset="0"/>
-              </a:rPr>
-              <a:t>1</a:t>
-            </a:r>
-            <a:r>
-              <a:rPr lang="en-US" sz="1400" dirty="0" smtClean="0">
-                <a:latin typeface="Times New Roman" charset="0"/>
-                <a:ea typeface="Times New Roman" charset="0"/>
-                <a:cs typeface="Times New Roman" charset="0"/>
-              </a:rPr>
-              <a:t>SH</a:t>
-            </a:r>
-            <a:endParaRPr lang="en-US" sz="1400" dirty="0">
-              <a:latin typeface="Times New Roman" charset="0"/>
-              <a:ea typeface="Times New Roman" charset="0"/>
-              <a:cs typeface="Times New Roman" charset="0"/>
-            </a:endParaRPr>
-          </a:p>
-        </p:txBody>
-      </p:sp>
-      <p:sp>
-        <p:nvSpPr>
-          <p:cNvPr id="57" name="Rectangle 56"/>
-          <p:cNvSpPr/>
-          <p:nvPr/>
-        </p:nvSpPr>
-        <p:spPr>
-          <a:xfrm>
-            <a:off x="5471708" y="1054850"/>
-            <a:ext cx="753732" cy="307777"/>
-          </a:xfrm>
-          <a:prstGeom prst="rect">
-            <a:avLst/>
-          </a:prstGeom>
-        </p:spPr>
-        <p:txBody>
-          <a:bodyPr wrap="none">
-            <a:spAutoFit/>
-          </a:bodyPr>
-          <a:lstStyle/>
-          <a:p>
-            <a:pPr algn="ctr"/>
-            <a:r>
-              <a:rPr lang="en-US" sz="1400" dirty="0" smtClean="0">
-                <a:latin typeface="Times New Roman" charset="0"/>
-                <a:ea typeface="Times New Roman" charset="0"/>
-                <a:cs typeface="Times New Roman" charset="0"/>
-              </a:rPr>
-              <a:t>    </a:t>
-            </a:r>
-            <a:r>
-              <a:rPr lang="en-US" sz="1400" dirty="0">
-                <a:latin typeface="Times New Roman" charset="0"/>
-                <a:ea typeface="Times New Roman" charset="0"/>
-                <a:cs typeface="Times New Roman" charset="0"/>
-              </a:rPr>
-              <a:t>𝜃</a:t>
-            </a:r>
-            <a:r>
-              <a:rPr lang="en-US" sz="1400" baseline="-25000" dirty="0">
-                <a:latin typeface="Times New Roman" charset="0"/>
-                <a:ea typeface="Times New Roman" charset="0"/>
-                <a:cs typeface="Times New Roman" charset="0"/>
-              </a:rPr>
-              <a:t>2</a:t>
-            </a:r>
-            <a:r>
-              <a:rPr lang="en-US" sz="1400" dirty="0">
-                <a:latin typeface="Times New Roman" charset="0"/>
-                <a:ea typeface="Times New Roman" charset="0"/>
-                <a:cs typeface="Times New Roman" charset="0"/>
-              </a:rPr>
-              <a:t>PH</a:t>
-            </a:r>
-            <a:endParaRPr lang="en-US" sz="1400" dirty="0">
-              <a:latin typeface="Times New Roman" charset="0"/>
-              <a:ea typeface="Times New Roman" charset="0"/>
-              <a:cs typeface="Times New Roman" charset="0"/>
-            </a:endParaRPr>
-          </a:p>
-        </p:txBody>
-      </p:sp>
-      <p:sp>
-        <p:nvSpPr>
-          <p:cNvPr id="31" name="Rectangle 30"/>
-          <p:cNvSpPr/>
-          <p:nvPr/>
-        </p:nvSpPr>
-        <p:spPr>
-          <a:xfrm>
-            <a:off x="6394424" y="2354550"/>
-            <a:ext cx="604654" cy="307777"/>
-          </a:xfrm>
-          <a:prstGeom prst="rect">
-            <a:avLst/>
-          </a:prstGeom>
-        </p:spPr>
-        <p:txBody>
-          <a:bodyPr wrap="none">
-            <a:spAutoFit/>
-          </a:bodyPr>
-          <a:lstStyle/>
-          <a:p>
-            <a:pPr algn="ctr"/>
-            <a:r>
-              <a:rPr lang="en-US" sz="1400" dirty="0" smtClean="0">
-                <a:latin typeface="Times New Roman" charset="0"/>
-                <a:ea typeface="Times New Roman" charset="0"/>
-                <a:cs typeface="Times New Roman" charset="0"/>
-              </a:rPr>
-              <a:t>𝜃</a:t>
-            </a:r>
-            <a:r>
-              <a:rPr lang="en-US" sz="1400" baseline="-25000" dirty="0" smtClean="0">
-                <a:latin typeface="Times New Roman" charset="0"/>
-                <a:ea typeface="Times New Roman" charset="0"/>
-                <a:cs typeface="Times New Roman" charset="0"/>
-              </a:rPr>
-              <a:t>3</a:t>
-            </a:r>
-            <a:r>
-              <a:rPr lang="en-US" sz="1400" dirty="0">
-                <a:latin typeface="Times New Roman" charset="0"/>
-                <a:ea typeface="Times New Roman" charset="0"/>
-                <a:cs typeface="Times New Roman" charset="0"/>
-              </a:rPr>
-              <a:t>A</a:t>
-            </a:r>
-            <a:r>
-              <a:rPr lang="en-US" sz="1400" dirty="0" smtClean="0">
-                <a:latin typeface="Times New Roman" charset="0"/>
-                <a:ea typeface="Times New Roman" charset="0"/>
-                <a:cs typeface="Times New Roman" charset="0"/>
-              </a:rPr>
-              <a:t>H</a:t>
-            </a:r>
-            <a:endParaRPr lang="en-US" sz="1400" dirty="0">
-              <a:latin typeface="Times New Roman" charset="0"/>
-              <a:ea typeface="Times New Roman" charset="0"/>
-              <a:cs typeface="Times New Roman" charset="0"/>
-            </a:endParaRPr>
-          </a:p>
-        </p:txBody>
-      </p:sp>
-      <p:cxnSp>
-        <p:nvCxnSpPr>
-          <p:cNvPr id="71" name="Straight Arrow Connector 70"/>
-          <p:cNvCxnSpPr/>
-          <p:nvPr/>
-        </p:nvCxnSpPr>
-        <p:spPr>
-          <a:xfrm flipV="1">
-            <a:off x="6018877" y="1866162"/>
-            <a:ext cx="0" cy="346908"/>
-          </a:xfrm>
-          <a:prstGeom prst="straightConnector1">
-            <a:avLst/>
-          </a:prstGeom>
-          <a:ln w="34925">
-            <a:solidFill>
-              <a:schemeClr val="accent2">
-                <a:lumMod val="75000"/>
-              </a:schemeClr>
-            </a:solidFill>
-            <a:headEnd type="oval" w="med" len="med"/>
-            <a:tailEnd type="triangle" w="lg" len="lg"/>
-          </a:ln>
-          <a:effectLst/>
-        </p:spPr>
-        <p:style>
-          <a:lnRef idx="2">
-            <a:schemeClr val="accent1"/>
-          </a:lnRef>
-          <a:fillRef idx="0">
-            <a:schemeClr val="accent1"/>
-          </a:fillRef>
-          <a:effectRef idx="1">
-            <a:schemeClr val="accent1"/>
-          </a:effectRef>
-          <a:fontRef idx="minor">
-            <a:schemeClr val="tx1"/>
-          </a:fontRef>
-        </p:style>
-      </p:cxnSp>
-      <p:cxnSp>
-        <p:nvCxnSpPr>
-          <p:cNvPr id="74" name="Straight Arrow Connector 73"/>
-          <p:cNvCxnSpPr/>
-          <p:nvPr/>
-        </p:nvCxnSpPr>
-        <p:spPr>
-          <a:xfrm flipV="1">
-            <a:off x="5466192" y="3187155"/>
-            <a:ext cx="2390564" cy="1397188"/>
-          </a:xfrm>
-          <a:prstGeom prst="straightConnector1">
-            <a:avLst/>
-          </a:prstGeom>
-          <a:ln w="34925">
-            <a:headEnd type="oval" w="med" len="med"/>
-            <a:tailEnd type="triangle" w="lg" len="lg"/>
-          </a:ln>
-          <a:effectLst/>
-        </p:spPr>
-        <p:style>
-          <a:lnRef idx="2">
-            <a:schemeClr val="accent1"/>
-          </a:lnRef>
-          <a:fillRef idx="0">
-            <a:schemeClr val="accent1"/>
-          </a:fillRef>
-          <a:effectRef idx="1">
-            <a:schemeClr val="accent1"/>
-          </a:effectRef>
-          <a:fontRef idx="minor">
-            <a:schemeClr val="tx1"/>
-          </a:fontRef>
-        </p:style>
-      </p:cxnSp>
-      <p:sp>
-        <p:nvSpPr>
-          <p:cNvPr id="75" name="Rectangle 74"/>
-          <p:cNvSpPr/>
-          <p:nvPr/>
-        </p:nvSpPr>
-        <p:spPr>
-          <a:xfrm>
-            <a:off x="6696751" y="3822359"/>
-            <a:ext cx="532518" cy="307777"/>
-          </a:xfrm>
-          <a:prstGeom prst="rect">
-            <a:avLst/>
-          </a:prstGeom>
-        </p:spPr>
-        <p:txBody>
-          <a:bodyPr wrap="none">
-            <a:spAutoFit/>
-          </a:bodyPr>
-          <a:lstStyle/>
-          <a:p>
-            <a:pPr algn="ctr"/>
-            <a:r>
-              <a:rPr lang="en-US" sz="1400" dirty="0">
-                <a:latin typeface="Times New Roman" charset="0"/>
-                <a:ea typeface="Times New Roman" charset="0"/>
-                <a:cs typeface="Times New Roman" charset="0"/>
-              </a:rPr>
-              <a:t> </a:t>
-            </a:r>
-            <a:r>
-              <a:rPr lang="en-US" sz="1400" dirty="0" err="1" smtClean="0">
-                <a:latin typeface="Times New Roman" charset="0"/>
-                <a:ea typeface="Times New Roman" charset="0"/>
-                <a:cs typeface="Times New Roman" charset="0"/>
-              </a:rPr>
-              <a:t>σ</a:t>
-            </a:r>
-            <a:r>
-              <a:rPr lang="en-US" sz="1400" baseline="-25000" dirty="0" err="1" smtClean="0">
-                <a:latin typeface="Times New Roman" charset="0"/>
-                <a:ea typeface="Times New Roman" charset="0"/>
-                <a:cs typeface="Times New Roman" charset="0"/>
-              </a:rPr>
-              <a:t>H</a:t>
-            </a:r>
-            <a:r>
-              <a:rPr lang="en-US" sz="1400" dirty="0" err="1" smtClean="0">
-                <a:latin typeface="Times New Roman" charset="0"/>
-                <a:ea typeface="Times New Roman" charset="0"/>
-                <a:cs typeface="Times New Roman" charset="0"/>
-              </a:rPr>
-              <a:t>R</a:t>
-            </a:r>
-            <a:endParaRPr lang="en-US" sz="1400" dirty="0">
-              <a:latin typeface="Times New Roman" charset="0"/>
-              <a:ea typeface="Times New Roman" charset="0"/>
-              <a:cs typeface="Times New Roman" charset="0"/>
-            </a:endParaRPr>
-          </a:p>
-        </p:txBody>
-      </p:sp>
-      <p:cxnSp>
-        <p:nvCxnSpPr>
-          <p:cNvPr id="77" name="Straight Arrow Connector 76"/>
-          <p:cNvCxnSpPr/>
-          <p:nvPr/>
-        </p:nvCxnSpPr>
-        <p:spPr>
-          <a:xfrm flipH="1">
-            <a:off x="5405069" y="3155792"/>
-            <a:ext cx="2023350" cy="1148356"/>
-          </a:xfrm>
-          <a:prstGeom prst="straightConnector1">
-            <a:avLst/>
-          </a:prstGeom>
-          <a:ln w="34925">
-            <a:headEnd type="oval" w="med" len="med"/>
-            <a:tailEnd type="triangle" w="lg" len="lg"/>
-          </a:ln>
-          <a:effectLst/>
-        </p:spPr>
-        <p:style>
-          <a:lnRef idx="2">
-            <a:schemeClr val="accent1"/>
-          </a:lnRef>
-          <a:fillRef idx="0">
-            <a:schemeClr val="accent1"/>
-          </a:fillRef>
-          <a:effectRef idx="1">
-            <a:schemeClr val="accent1"/>
-          </a:effectRef>
-          <a:fontRef idx="minor">
-            <a:schemeClr val="tx1"/>
-          </a:fontRef>
-        </p:style>
-      </p:cxnSp>
-      <p:sp>
-        <p:nvSpPr>
-          <p:cNvPr id="82" name="Rectangle 81"/>
-          <p:cNvSpPr/>
-          <p:nvPr/>
-        </p:nvSpPr>
-        <p:spPr>
-          <a:xfrm>
-            <a:off x="6291601" y="3373776"/>
-            <a:ext cx="405880" cy="307777"/>
-          </a:xfrm>
-          <a:prstGeom prst="rect">
-            <a:avLst/>
-          </a:prstGeom>
-        </p:spPr>
-        <p:txBody>
-          <a:bodyPr wrap="none">
-            <a:spAutoFit/>
-          </a:bodyPr>
-          <a:lstStyle/>
-          <a:p>
-            <a:pPr algn="ctr"/>
-            <a:r>
-              <a:rPr lang="en-US" sz="1400" smtClean="0">
-                <a:latin typeface="Times New Roman" charset="0"/>
-                <a:ea typeface="Times New Roman" charset="0"/>
-                <a:cs typeface="Times New Roman" charset="0"/>
-              </a:rPr>
-              <a:t>𝜈H</a:t>
-            </a:r>
-            <a:endParaRPr lang="en-US" sz="1400" dirty="0">
-              <a:latin typeface="Times New Roman" charset="0"/>
-              <a:ea typeface="Times New Roman" charset="0"/>
-              <a:cs typeface="Times New Roman" charset="0"/>
-            </a:endParaRPr>
+              <a:t>𝜇(S+P+R)+𝜇*A</a:t>
+            </a:r>
           </a:p>
         </p:txBody>
       </p:sp>

</xml_diff>